<commit_message>
I am learning R Statistics
</commit_message>
<xml_diff>
--- a/Practice/연습문제 data/R 연습문제.pptx
+++ b/Practice/연습문제 data/R 연습문제.pptx
@@ -5,7 +5,7 @@
     <p:sldMasterId id="2147483648" r:id="rId1"/>
   </p:sldMasterIdLst>
   <p:notesMasterIdLst>
-    <p:notesMasterId r:id="rId13"/>
+    <p:notesMasterId r:id="rId16"/>
   </p:notesMasterIdLst>
   <p:sldIdLst>
     <p:sldId id="259" r:id="rId2"/>
@@ -19,6 +19,9 @@
     <p:sldId id="266" r:id="rId10"/>
     <p:sldId id="267" r:id="rId11"/>
     <p:sldId id="268" r:id="rId12"/>
+    <p:sldId id="269" r:id="rId13"/>
+    <p:sldId id="270" r:id="rId14"/>
+    <p:sldId id="271" r:id="rId15"/>
   </p:sldIdLst>
   <p:sldSz cx="9144000" cy="6858000" type="screen4x3"/>
   <p:notesSz cx="6858000" cy="9144000"/>
@@ -202,7 +205,7 @@
           <a:p>
             <a:fld id="{F8EE9BE4-BA73-4D39-86BF-4ECBF107F1A2}" type="datetimeFigureOut">
               <a:rPr lang="ko-KR" altLang="en-US" smtClean="0"/>
-              <a:t>2019-06-25</a:t>
+              <a:t>2019-06-26</a:t>
             </a:fld>
             <a:endParaRPr lang="ko-KR" altLang="en-US"/>
           </a:p>
@@ -616,7 +619,7 @@
           <a:p>
             <a:fld id="{21845987-2C55-46C3-B831-AE09533DBD3E}" type="datetime1">
               <a:rPr lang="ko-KR" altLang="en-US" smtClean="0"/>
-              <a:t>2019-06-25</a:t>
+              <a:t>2019-06-26</a:t>
             </a:fld>
             <a:endParaRPr lang="ko-KR" altLang="en-US"/>
           </a:p>
@@ -744,7 +747,7 @@
           <a:p>
             <a:fld id="{BFC15BBE-F44D-4F1F-A330-F82D13529371}" type="datetime1">
               <a:rPr lang="ko-KR" altLang="en-US" smtClean="0"/>
-              <a:t>2019-06-25</a:t>
+              <a:t>2019-06-26</a:t>
             </a:fld>
             <a:endParaRPr lang="ko-KR" altLang="en-US"/>
           </a:p>
@@ -924,7 +927,7 @@
           <a:p>
             <a:fld id="{AF55841B-9C56-4B13-96CD-0F02E1FA3938}" type="datetime1">
               <a:rPr lang="ko-KR" altLang="en-US" smtClean="0"/>
-              <a:t>2019-06-25</a:t>
+              <a:t>2019-06-26</a:t>
             </a:fld>
             <a:endParaRPr lang="ko-KR" altLang="en-US"/>
           </a:p>
@@ -1094,7 +1097,7 @@
           <a:p>
             <a:fld id="{2ABF20A8-D685-4CF2-B639-02FF1506B0EE}" type="datetime1">
               <a:rPr lang="ko-KR" altLang="en-US" smtClean="0"/>
-              <a:t>2019-06-25</a:t>
+              <a:t>2019-06-26</a:t>
             </a:fld>
             <a:endParaRPr lang="ko-KR" altLang="en-US"/>
           </a:p>
@@ -1340,7 +1343,7 @@
           <a:p>
             <a:fld id="{2811EE05-8720-4A70-86E4-81F89E9A0E97}" type="datetime1">
               <a:rPr lang="ko-KR" altLang="en-US" smtClean="0"/>
-              <a:t>2019-06-25</a:t>
+              <a:t>2019-06-26</a:t>
             </a:fld>
             <a:endParaRPr lang="ko-KR" altLang="en-US"/>
           </a:p>
@@ -1628,7 +1631,7 @@
           <a:p>
             <a:fld id="{4A1C758F-DBB4-457E-A726-1AAB5F25B981}" type="datetime1">
               <a:rPr lang="ko-KR" altLang="en-US" smtClean="0"/>
-              <a:t>2019-06-25</a:t>
+              <a:t>2019-06-26</a:t>
             </a:fld>
             <a:endParaRPr lang="ko-KR" altLang="en-US"/>
           </a:p>
@@ -2050,7 +2053,7 @@
           <a:p>
             <a:fld id="{7B601672-9529-4A60-880B-20248A654710}" type="datetime1">
               <a:rPr lang="ko-KR" altLang="en-US" smtClean="0"/>
-              <a:t>2019-06-25</a:t>
+              <a:t>2019-06-26</a:t>
             </a:fld>
             <a:endParaRPr lang="ko-KR" altLang="en-US"/>
           </a:p>
@@ -2168,7 +2171,7 @@
           <a:p>
             <a:fld id="{C95B78CF-F6D9-4B1C-9763-19B11B300263}" type="datetime1">
               <a:rPr lang="ko-KR" altLang="en-US" smtClean="0"/>
-              <a:t>2019-06-25</a:t>
+              <a:t>2019-06-26</a:t>
             </a:fld>
             <a:endParaRPr lang="ko-KR" altLang="en-US"/>
           </a:p>
@@ -2263,7 +2266,7 @@
           <a:p>
             <a:fld id="{5922D0F6-4AA9-49FC-859A-85F46D10708C}" type="datetime1">
               <a:rPr lang="ko-KR" altLang="en-US" smtClean="0"/>
-              <a:t>2019-06-25</a:t>
+              <a:t>2019-06-26</a:t>
             </a:fld>
             <a:endParaRPr lang="ko-KR" altLang="en-US"/>
           </a:p>
@@ -2540,7 +2543,7 @@
           <a:p>
             <a:fld id="{CEDA55FF-F5DC-4391-BDEA-D69D740997F9}" type="datetime1">
               <a:rPr lang="ko-KR" altLang="en-US" smtClean="0"/>
-              <a:t>2019-06-25</a:t>
+              <a:t>2019-06-26</a:t>
             </a:fld>
             <a:endParaRPr lang="ko-KR" altLang="en-US"/>
           </a:p>
@@ -2793,7 +2796,7 @@
           <a:p>
             <a:fld id="{D2D6606D-0E2F-4E15-83D6-FE608293D64D}" type="datetime1">
               <a:rPr lang="ko-KR" altLang="en-US" smtClean="0"/>
-              <a:t>2019-06-25</a:t>
+              <a:t>2019-06-26</a:t>
             </a:fld>
             <a:endParaRPr lang="ko-KR" altLang="en-US"/>
           </a:p>
@@ -3006,7 +3009,7 @@
           <a:p>
             <a:fld id="{7F3773C4-A1CC-40B4-8E1B-E8B2DF0E5786}" type="datetime1">
               <a:rPr lang="ko-KR" altLang="en-US" smtClean="0"/>
-              <a:t>2019-06-25</a:t>
+              <a:t>2019-06-26</a:t>
             </a:fld>
             <a:endParaRPr lang="ko-KR" altLang="en-US"/>
           </a:p>
@@ -3697,7 +3700,7 @@
         <p:spPr>
           <a:xfrm>
             <a:off x="353672" y="620688"/>
-            <a:ext cx="8709436" cy="4893647"/>
+            <a:ext cx="8709436" cy="5262979"/>
           </a:xfrm>
           <a:prstGeom prst="rect">
             <a:avLst/>
@@ -3808,34 +3811,87 @@
               <a:rPr lang="ko-KR" altLang="en-US" sz="1600" b="1" dirty="0" smtClean="0">
                 <a:latin typeface="+mn-ea"/>
               </a:rPr>
-              <a:t>등교하는 학생의 비율 </a:t>
-            </a:r>
-            <a:r>
-              <a:rPr lang="en-US" altLang="ko-KR" sz="1600" b="1" dirty="0" smtClean="0">
+              <a:t>등교하는 </a:t>
+            </a:r>
+            <a:r>
+              <a:rPr lang="ko-KR" altLang="en-US" sz="1600" b="1" dirty="0">
+                <a:latin typeface="+mn-ea"/>
+              </a:rPr>
+              <a:t>학생의 비율 </a:t>
+            </a:r>
+            <a:r>
+              <a:rPr lang="en-US" altLang="ko-KR" sz="1600" b="1" dirty="0">
                 <a:latin typeface="+mn-ea"/>
               </a:rPr>
               <a:t>p</a:t>
             </a:r>
             <a:r>
-              <a:rPr lang="ko-KR" altLang="en-US" sz="1600" b="1" dirty="0" smtClean="0">
+              <a:rPr lang="ko-KR" altLang="en-US" sz="1600" b="1" dirty="0">
                 <a:latin typeface="+mn-ea"/>
               </a:rPr>
               <a:t>에 대한 신뢰도 </a:t>
             </a:r>
             <a:r>
-              <a:rPr lang="en-US" altLang="ko-KR" sz="1600" b="1" dirty="0" smtClean="0">
+              <a:rPr lang="en-US" altLang="ko-KR" sz="1600" b="1" dirty="0">
                 <a:latin typeface="+mn-ea"/>
               </a:rPr>
               <a:t>95%</a:t>
             </a:r>
             <a:r>
-              <a:rPr lang="ko-KR" altLang="en-US" sz="1600" b="1" dirty="0" smtClean="0">
-                <a:latin typeface="+mn-ea"/>
-              </a:rPr>
-              <a:t>의 신뢰 구간을 구하시오</a:t>
-            </a:r>
-            <a:r>
-              <a:rPr lang="en-US" altLang="ko-KR" sz="1600" b="1" dirty="0" smtClean="0">
+              <a:rPr lang="ko-KR" altLang="en-US" sz="1600" b="1" dirty="0">
+                <a:latin typeface="+mn-ea"/>
+              </a:rPr>
+              <a:t>의 신뢰구간이 </a:t>
+            </a:r>
+            <a:r>
+              <a:rPr lang="en-US" altLang="ko-KR" sz="1600" b="1" dirty="0">
+                <a:latin typeface="+mn-ea"/>
+              </a:rPr>
+              <a:t>a ≤ m ≤ b </a:t>
+            </a:r>
+            <a:r>
+              <a:rPr lang="ko-KR" altLang="en-US" sz="1600" b="1" dirty="0">
+                <a:latin typeface="+mn-ea"/>
+              </a:rPr>
+              <a:t>이다</a:t>
+            </a:r>
+            <a:r>
+              <a:rPr lang="en-US" altLang="ko-KR" sz="1600" b="1" dirty="0">
+                <a:latin typeface="+mn-ea"/>
+              </a:rPr>
+              <a:t>.</a:t>
+            </a:r>
+            <a:br>
+              <a:rPr lang="en-US" altLang="ko-KR" sz="1600" b="1" dirty="0">
+                <a:latin typeface="+mn-ea"/>
+              </a:rPr>
+            </a:br>
+            <a:r>
+              <a:rPr lang="en-US" altLang="ko-KR" sz="1600" b="1" dirty="0">
+                <a:latin typeface="+mn-ea"/>
+              </a:rPr>
+              <a:t>b – a = 0.14 </a:t>
+            </a:r>
+            <a:r>
+              <a:rPr lang="ko-KR" altLang="en-US" sz="1600" b="1" dirty="0">
+                <a:latin typeface="+mn-ea"/>
+              </a:rPr>
+              <a:t>일 때 </a:t>
+            </a:r>
+            <a:r>
+              <a:rPr lang="en-US" altLang="ko-KR" sz="1600" b="1" dirty="0">
+                <a:latin typeface="+mn-ea"/>
+              </a:rPr>
+              <a:t>n</a:t>
+            </a:r>
+            <a:r>
+              <a:rPr lang="ko-KR" altLang="en-US" sz="1600" b="1" dirty="0">
+                <a:latin typeface="+mn-ea"/>
+              </a:rPr>
+              <a:t>의 값을 구하시오</a:t>
+            </a:r>
+            <a:r>
+              <a:rPr lang="en-US" altLang="ko-KR" sz="1600" b="1" dirty="0">
                 <a:latin typeface="+mn-ea"/>
               </a:rPr>
               <a:t>.</a:t>
@@ -4761,11 +4817,7 @@
           <a:p>
             <a:r>
               <a:rPr lang="en-US" altLang="ko-KR" b="1" dirty="0" smtClean="0"/>
-              <a:t>7. </a:t>
-            </a:r>
-            <a:r>
-              <a:rPr lang="en-US" altLang="ko-KR" b="1" dirty="0" smtClean="0"/>
-              <a:t>1-Sample T </a:t>
+              <a:t>7. 1-Sample T </a:t>
             </a:r>
             <a:r>
               <a:rPr lang="ko-KR" altLang="en-US" b="1" dirty="0" smtClean="0"/>
@@ -4779,6 +4831,1301 @@
     <p:extLst>
       <p:ext uri="{BB962C8B-B14F-4D97-AF65-F5344CB8AC3E}">
         <p14:creationId xmlns:p14="http://schemas.microsoft.com/office/powerpoint/2010/main" val="833444148"/>
+      </p:ext>
+    </p:extLst>
+  </p:cSld>
+  <p:clrMapOvr>
+    <a:masterClrMapping/>
+  </p:clrMapOvr>
+  <p:timing>
+    <p:tnLst>
+      <p:par>
+        <p:cTn id="1" dur="indefinite" restart="never" nodeType="tmRoot"/>
+      </p:par>
+    </p:tnLst>
+  </p:timing>
+</p:sld>
+</file>
+
+<file path=ppt/slides/slide12.xml><?xml version="1.0" encoding="utf-8"?>
+<p:sld xmlns:a="http://schemas.openxmlformats.org/drawingml/2006/main" xmlns:r="http://schemas.openxmlformats.org/officeDocument/2006/relationships" xmlns:p="http://schemas.openxmlformats.org/presentationml/2006/main">
+  <p:cSld>
+    <p:spTree>
+      <p:nvGrpSpPr>
+        <p:cNvPr id="1" name=""/>
+        <p:cNvGrpSpPr/>
+        <p:nvPr/>
+      </p:nvGrpSpPr>
+      <p:grpSpPr>
+        <a:xfrm>
+          <a:off x="0" y="0"/>
+          <a:ext cx="0" cy="0"/>
+          <a:chOff x="0" y="0"/>
+          <a:chExt cx="0" cy="0"/>
+        </a:xfrm>
+      </p:grpSpPr>
+      <p:sp>
+        <p:nvSpPr>
+          <p:cNvPr id="4" name="TextBox 3"/>
+          <p:cNvSpPr txBox="1"/>
+          <p:nvPr/>
+        </p:nvSpPr>
+        <p:spPr>
+          <a:xfrm>
+            <a:off x="353672" y="620688"/>
+            <a:ext cx="8298747" cy="4154984"/>
+          </a:xfrm>
+          <a:prstGeom prst="rect">
+            <a:avLst/>
+          </a:prstGeom>
+          <a:noFill/>
+        </p:spPr>
+        <p:txBody>
+          <a:bodyPr wrap="none" rtlCol="0">
+            <a:spAutoFit/>
+          </a:bodyPr>
+          <a:lstStyle/>
+          <a:p>
+            <a:pPr marL="342900" indent="-342900">
+              <a:lnSpc>
+                <a:spcPct val="150000"/>
+              </a:lnSpc>
+              <a:buFont typeface="+mj-lt"/>
+              <a:buAutoNum type="arabicPeriod"/>
+            </a:pPr>
+            <a:r>
+              <a:rPr lang="en-US" altLang="ko-KR" sz="1600" b="1" dirty="0" err="1" smtClean="0">
+                <a:latin typeface="+mn-ea"/>
+              </a:rPr>
+              <a:t>mtcars</a:t>
+            </a:r>
+            <a:r>
+              <a:rPr lang="en-US" altLang="ko-KR" sz="1600" b="1" dirty="0" smtClean="0">
+                <a:latin typeface="+mn-ea"/>
+              </a:rPr>
+              <a:t> </a:t>
+            </a:r>
+            <a:r>
+              <a:rPr lang="ko-KR" altLang="en-US" sz="1600" b="1" dirty="0" err="1" smtClean="0">
+                <a:latin typeface="+mn-ea"/>
+              </a:rPr>
+              <a:t>데이터셋에서</a:t>
+            </a:r>
+            <a:r>
+              <a:rPr lang="ko-KR" altLang="en-US" sz="1600" b="1" dirty="0" smtClean="0">
+                <a:latin typeface="+mn-ea"/>
+              </a:rPr>
+              <a:t> 자동차 </a:t>
+            </a:r>
+            <a:r>
+              <a:rPr lang="ko-KR" altLang="en-US" sz="1600" b="1" dirty="0">
+                <a:latin typeface="+mn-ea"/>
+              </a:rPr>
+              <a:t>기어 종류</a:t>
+            </a:r>
+            <a:r>
+              <a:rPr lang="en-US" altLang="ko-KR" sz="1600" b="1" dirty="0" smtClean="0">
+                <a:latin typeface="+mn-ea"/>
+              </a:rPr>
+              <a:t>(am: </a:t>
+            </a:r>
+            <a:r>
+              <a:rPr lang="ko-KR" altLang="en-US" sz="1600" b="1" dirty="0" smtClean="0">
+                <a:latin typeface="+mn-ea"/>
+              </a:rPr>
+              <a:t>오토</a:t>
+            </a:r>
+            <a:r>
+              <a:rPr lang="en-US" altLang="ko-KR" sz="1600" b="1" dirty="0">
+                <a:latin typeface="+mn-ea"/>
+              </a:rPr>
+              <a:t>/</a:t>
+            </a:r>
+            <a:r>
+              <a:rPr lang="ko-KR" altLang="en-US" sz="1600" b="1" dirty="0">
+                <a:latin typeface="+mn-ea"/>
+              </a:rPr>
+              <a:t>수동</a:t>
+            </a:r>
+            <a:r>
+              <a:rPr lang="en-US" altLang="ko-KR" sz="1600" b="1" dirty="0">
+                <a:latin typeface="+mn-ea"/>
+              </a:rPr>
+              <a:t>)</a:t>
+            </a:r>
+            <a:r>
+              <a:rPr lang="ko-KR" altLang="en-US" sz="1600" b="1" dirty="0">
+                <a:latin typeface="+mn-ea"/>
+              </a:rPr>
+              <a:t>에 따른 </a:t>
+            </a:r>
+            <a:r>
+              <a:rPr lang="en-US" altLang="ko-KR" sz="1600" b="1" dirty="0">
+                <a:latin typeface="+mn-ea"/>
+              </a:rPr>
+              <a:t>mpg</a:t>
+            </a:r>
+            <a:r>
+              <a:rPr lang="ko-KR" altLang="en-US" sz="1600" b="1" dirty="0">
+                <a:latin typeface="+mn-ea"/>
+              </a:rPr>
+              <a:t>의 차이가 </a:t>
+            </a:r>
+            <a:r>
+              <a:rPr lang="en-US" altLang="ko-KR" sz="1600" b="1" dirty="0" smtClean="0">
+                <a:latin typeface="+mn-ea"/>
+              </a:rPr>
+              <a:t/>
+            </a:r>
+            <a:br>
+              <a:rPr lang="en-US" altLang="ko-KR" sz="1600" b="1" dirty="0" smtClean="0">
+                <a:latin typeface="+mn-ea"/>
+              </a:rPr>
+            </a:br>
+            <a:r>
+              <a:rPr lang="ko-KR" altLang="en-US" sz="1600" b="1" dirty="0" smtClean="0">
+                <a:latin typeface="+mn-ea"/>
+              </a:rPr>
+              <a:t>통계적으로 </a:t>
+            </a:r>
+            <a:r>
+              <a:rPr lang="ko-KR" altLang="en-US" sz="1600" b="1" dirty="0">
+                <a:latin typeface="+mn-ea"/>
+              </a:rPr>
+              <a:t>유의한지 </a:t>
+            </a:r>
+            <a:r>
+              <a:rPr lang="en-US" altLang="ko-KR" sz="1600" b="1" dirty="0">
+                <a:latin typeface="+mn-ea"/>
+              </a:rPr>
+              <a:t>t-test</a:t>
+            </a:r>
+            <a:r>
+              <a:rPr lang="ko-KR" altLang="en-US" sz="1600" b="1" dirty="0">
+                <a:latin typeface="+mn-ea"/>
+              </a:rPr>
+              <a:t>를 통해 </a:t>
+            </a:r>
+            <a:r>
+              <a:rPr lang="ko-KR" altLang="en-US" sz="1600" b="1" dirty="0" smtClean="0">
+                <a:latin typeface="+mn-ea"/>
+              </a:rPr>
+              <a:t>확인해 보시오</a:t>
+            </a:r>
+            <a:r>
+              <a:rPr lang="en-US" altLang="ko-KR" sz="1600" b="1" dirty="0" smtClean="0">
+                <a:latin typeface="+mn-ea"/>
+              </a:rPr>
+              <a:t>.</a:t>
+            </a:r>
+          </a:p>
+          <a:p>
+            <a:pPr marL="342900" indent="-342900">
+              <a:lnSpc>
+                <a:spcPct val="150000"/>
+              </a:lnSpc>
+              <a:buFont typeface="+mj-lt"/>
+              <a:buAutoNum type="arabicPeriod"/>
+            </a:pPr>
+            <a:endParaRPr lang="en-US" altLang="ko-KR" sz="1600" b="1" dirty="0">
+              <a:latin typeface="+mn-ea"/>
+            </a:endParaRPr>
+          </a:p>
+          <a:p>
+            <a:pPr marL="342900" indent="-342900">
+              <a:lnSpc>
+                <a:spcPct val="150000"/>
+              </a:lnSpc>
+              <a:buFont typeface="+mj-lt"/>
+              <a:buAutoNum type="arabicPeriod"/>
+            </a:pPr>
+            <a:r>
+              <a:rPr lang="en-US" altLang="ko-KR" sz="1600" b="1" dirty="0">
+                <a:latin typeface="+mn-ea"/>
+              </a:rPr>
+              <a:t>MASS </a:t>
+            </a:r>
+            <a:r>
+              <a:rPr lang="ko-KR" altLang="en-US" sz="1600" b="1" dirty="0">
+                <a:latin typeface="+mn-ea"/>
+              </a:rPr>
+              <a:t>패키지에 내장된 </a:t>
+            </a:r>
+            <a:r>
+              <a:rPr lang="en-US" altLang="ko-KR" sz="1600" b="1" dirty="0">
+                <a:latin typeface="+mn-ea"/>
+              </a:rPr>
+              <a:t>Cars93 </a:t>
+            </a:r>
+            <a:r>
+              <a:rPr lang="ko-KR" altLang="en-US" sz="1600" b="1" dirty="0" smtClean="0">
+                <a:latin typeface="+mn-ea"/>
+              </a:rPr>
+              <a:t>데이터프레임에 대해서 생산국</a:t>
+            </a:r>
+            <a:r>
+              <a:rPr lang="en-US" altLang="ko-KR" sz="1600" b="1" dirty="0" smtClean="0">
+                <a:latin typeface="+mn-ea"/>
+              </a:rPr>
+              <a:t>(</a:t>
+            </a:r>
+            <a:r>
+              <a:rPr lang="en-US" altLang="ko-KR" sz="1600" b="1" dirty="0">
+                <a:latin typeface="+mn-ea"/>
+              </a:rPr>
+              <a:t>Origin</a:t>
+            </a:r>
+            <a:r>
+              <a:rPr lang="en-US" altLang="ko-KR" sz="1600" b="1" dirty="0" smtClean="0">
+                <a:latin typeface="+mn-ea"/>
+              </a:rPr>
+              <a:t>)</a:t>
+            </a:r>
+            <a:r>
+              <a:rPr lang="ko-KR" altLang="en-US" sz="1600" b="1" dirty="0" smtClean="0">
+                <a:latin typeface="+mn-ea"/>
+              </a:rPr>
+              <a:t>이</a:t>
+            </a:r>
+            <a:r>
+              <a:rPr lang="en-US" altLang="ko-KR" sz="1600" b="1" dirty="0" smtClean="0">
+                <a:latin typeface="+mn-ea"/>
+              </a:rPr>
+              <a:t/>
+            </a:r>
+            <a:br>
+              <a:rPr lang="en-US" altLang="ko-KR" sz="1600" b="1" dirty="0" smtClean="0">
+                <a:latin typeface="+mn-ea"/>
+              </a:rPr>
+            </a:br>
+            <a:r>
+              <a:rPr lang="en-US" altLang="ko-KR" sz="1600" b="1" dirty="0" smtClean="0">
+                <a:latin typeface="+mn-ea"/>
+              </a:rPr>
+              <a:t>USA </a:t>
+            </a:r>
+            <a:r>
+              <a:rPr lang="en-US" altLang="ko-KR" sz="1600" b="1" dirty="0">
+                <a:latin typeface="+mn-ea"/>
+              </a:rPr>
+              <a:t>vs. non-USA 2</a:t>
+            </a:r>
+            <a:r>
+              <a:rPr lang="ko-KR" altLang="en-US" sz="1600" b="1" dirty="0">
+                <a:latin typeface="+mn-ea"/>
+              </a:rPr>
+              <a:t>개의 </a:t>
+            </a:r>
+            <a:r>
+              <a:rPr lang="en-US" altLang="ko-KR" sz="1600" b="1" dirty="0">
+                <a:latin typeface="+mn-ea"/>
+              </a:rPr>
+              <a:t>group </a:t>
+            </a:r>
+            <a:r>
+              <a:rPr lang="ko-KR" altLang="en-US" sz="1600" b="1" dirty="0">
+                <a:latin typeface="+mn-ea"/>
+              </a:rPr>
+              <a:t>에 대해서 차 가격</a:t>
+            </a:r>
+            <a:r>
+              <a:rPr lang="en-US" altLang="ko-KR" sz="1600" b="1" dirty="0">
+                <a:latin typeface="+mn-ea"/>
+              </a:rPr>
+              <a:t>(Price)</a:t>
+            </a:r>
+            <a:r>
+              <a:rPr lang="ko-KR" altLang="en-US" sz="1600" b="1" dirty="0">
+                <a:latin typeface="+mn-ea"/>
+              </a:rPr>
+              <a:t>의 평균이 차이가 </a:t>
+            </a:r>
+            <a:r>
+              <a:rPr lang="ko-KR" altLang="en-US" sz="1600" b="1" dirty="0" smtClean="0">
+                <a:latin typeface="+mn-ea"/>
+              </a:rPr>
+              <a:t>있는지를</a:t>
+            </a:r>
+            <a:r>
+              <a:rPr lang="en-US" altLang="ko-KR" sz="1600" b="1" dirty="0" smtClean="0">
+                <a:latin typeface="+mn-ea"/>
+              </a:rPr>
+              <a:t/>
+            </a:r>
+            <a:br>
+              <a:rPr lang="en-US" altLang="ko-KR" sz="1600" b="1" dirty="0" smtClean="0">
+                <a:latin typeface="+mn-ea"/>
+              </a:rPr>
+            </a:br>
+            <a:r>
+              <a:rPr lang="ko-KR" altLang="en-US" sz="1600" b="1" dirty="0" smtClean="0">
+                <a:latin typeface="+mn-ea"/>
+              </a:rPr>
+              <a:t>검정해보시오</a:t>
+            </a:r>
+            <a:r>
+              <a:rPr lang="en-US" altLang="ko-KR" sz="1600" b="1" dirty="0" smtClean="0">
+                <a:latin typeface="+mn-ea"/>
+              </a:rPr>
+              <a:t>.</a:t>
+            </a:r>
+            <a:endParaRPr lang="ko-KR" altLang="en-US" sz="1600" b="1" dirty="0">
+              <a:latin typeface="+mn-ea"/>
+            </a:endParaRPr>
+          </a:p>
+          <a:p>
+            <a:pPr marL="342900" indent="-342900">
+              <a:lnSpc>
+                <a:spcPct val="150000"/>
+              </a:lnSpc>
+              <a:buFont typeface="+mj-lt"/>
+              <a:buAutoNum type="arabicPeriod"/>
+            </a:pPr>
+            <a:endParaRPr lang="en-US" altLang="ko-KR" sz="1600" b="1" dirty="0" smtClean="0">
+              <a:latin typeface="+mn-ea"/>
+            </a:endParaRPr>
+          </a:p>
+          <a:p>
+            <a:pPr marL="342900" indent="-342900">
+              <a:lnSpc>
+                <a:spcPct val="150000"/>
+              </a:lnSpc>
+              <a:buFont typeface="+mj-lt"/>
+              <a:buAutoNum type="arabicPeriod"/>
+            </a:pPr>
+            <a:r>
+              <a:rPr lang="en-US" altLang="ko-KR" sz="1600" b="1" dirty="0" smtClean="0">
+                <a:latin typeface="+mn-ea"/>
+              </a:rPr>
+              <a:t>mpg </a:t>
+            </a:r>
+            <a:r>
+              <a:rPr lang="ko-KR" altLang="en-US" sz="1600" b="1" dirty="0" err="1" smtClean="0">
+                <a:latin typeface="+mn-ea"/>
+              </a:rPr>
+              <a:t>데이터셋에서</a:t>
+            </a:r>
+            <a:r>
+              <a:rPr lang="ko-KR" altLang="en-US" sz="1600" b="1" dirty="0" smtClean="0">
+                <a:latin typeface="+mn-ea"/>
+              </a:rPr>
+              <a:t> 다음을 검정해 보시오</a:t>
+            </a:r>
+            <a:r>
+              <a:rPr lang="en-US" altLang="ko-KR" sz="1600" b="1" dirty="0" smtClean="0">
+                <a:latin typeface="+mn-ea"/>
+              </a:rPr>
+              <a:t>.</a:t>
+            </a:r>
+            <a:br>
+              <a:rPr lang="en-US" altLang="ko-KR" sz="1600" b="1" dirty="0" smtClean="0">
+                <a:latin typeface="+mn-ea"/>
+              </a:rPr>
+            </a:br>
+            <a:r>
+              <a:rPr lang="en-US" altLang="ko-KR" sz="1600" b="1" dirty="0" smtClean="0">
+                <a:latin typeface="+mn-ea"/>
+              </a:rPr>
+              <a:t>   1) subcompact </a:t>
+            </a:r>
+            <a:r>
+              <a:rPr lang="ko-KR" altLang="en-US" sz="1600" b="1" dirty="0" smtClean="0">
+                <a:latin typeface="+mn-ea"/>
+              </a:rPr>
+              <a:t>자동차와 </a:t>
+            </a:r>
+            <a:r>
+              <a:rPr lang="en-US" altLang="ko-KR" sz="1600" b="1" dirty="0" smtClean="0">
+                <a:latin typeface="+mn-ea"/>
+              </a:rPr>
+              <a:t>midsize </a:t>
+            </a:r>
+            <a:r>
+              <a:rPr lang="ko-KR" altLang="en-US" sz="1600" b="1" dirty="0" smtClean="0">
+                <a:latin typeface="+mn-ea"/>
+              </a:rPr>
+              <a:t>자동차의 고속도로 연비</a:t>
+            </a:r>
+            <a:r>
+              <a:rPr lang="en-US" altLang="ko-KR" sz="1600" b="1" dirty="0">
+                <a:latin typeface="+mn-ea"/>
+              </a:rPr>
+              <a:t/>
+            </a:r>
+            <a:br>
+              <a:rPr lang="en-US" altLang="ko-KR" sz="1600" b="1" dirty="0">
+                <a:latin typeface="+mn-ea"/>
+              </a:rPr>
+            </a:br>
+            <a:r>
+              <a:rPr lang="en-US" altLang="ko-KR" sz="1600" b="1" dirty="0" smtClean="0">
+                <a:latin typeface="+mn-ea"/>
+              </a:rPr>
+              <a:t>   2) </a:t>
+            </a:r>
+            <a:r>
+              <a:rPr lang="ko-KR" altLang="en-US" sz="1600" b="1" dirty="0" smtClean="0">
+                <a:latin typeface="+mn-ea"/>
+              </a:rPr>
+              <a:t>일반 휘발유</a:t>
+            </a:r>
+            <a:r>
+              <a:rPr lang="en-US" altLang="ko-KR" sz="1600" b="1" dirty="0" smtClean="0">
+                <a:latin typeface="+mn-ea"/>
+              </a:rPr>
+              <a:t>(r)</a:t>
+            </a:r>
+            <a:r>
+              <a:rPr lang="ko-KR" altLang="en-US" sz="1600" b="1" dirty="0" smtClean="0">
+                <a:latin typeface="+mn-ea"/>
+              </a:rPr>
+              <a:t>와 고급 휘발유</a:t>
+            </a:r>
+            <a:r>
+              <a:rPr lang="en-US" altLang="ko-KR" sz="1600" b="1" dirty="0" smtClean="0">
+                <a:latin typeface="+mn-ea"/>
+              </a:rPr>
+              <a:t>(p)</a:t>
+            </a:r>
+            <a:r>
+              <a:rPr lang="ko-KR" altLang="en-US" sz="1600" b="1" dirty="0" smtClean="0">
+                <a:latin typeface="+mn-ea"/>
+              </a:rPr>
+              <a:t>의 도시 연비</a:t>
+            </a:r>
+            <a:r>
+              <a:rPr lang="en-US" altLang="ko-KR" sz="1600" b="1" dirty="0" smtClean="0">
+                <a:latin typeface="+mn-ea"/>
+              </a:rPr>
+              <a:t/>
+            </a:r>
+            <a:br>
+              <a:rPr lang="en-US" altLang="ko-KR" sz="1600" b="1" dirty="0" smtClean="0">
+                <a:latin typeface="+mn-ea"/>
+              </a:rPr>
+            </a:br>
+            <a:r>
+              <a:rPr lang="en-US" altLang="ko-KR" sz="1600" b="1" dirty="0" smtClean="0">
+                <a:latin typeface="+mn-ea"/>
+              </a:rPr>
+              <a:t>   3) subcompact </a:t>
+            </a:r>
+            <a:r>
+              <a:rPr lang="ko-KR" altLang="en-US" sz="1600" b="1" dirty="0" smtClean="0">
+                <a:latin typeface="+mn-ea"/>
+              </a:rPr>
+              <a:t>자동차의 </a:t>
+            </a:r>
+            <a:r>
+              <a:rPr lang="ko-KR" altLang="en-US" sz="1600" b="1" dirty="0" err="1" smtClean="0">
+                <a:latin typeface="+mn-ea"/>
+              </a:rPr>
+              <a:t>전륜구동</a:t>
+            </a:r>
+            <a:r>
+              <a:rPr lang="en-US" altLang="ko-KR" sz="1600" b="1" dirty="0" smtClean="0">
+                <a:latin typeface="+mn-ea"/>
+              </a:rPr>
+              <a:t>(f)</a:t>
+            </a:r>
+            <a:r>
+              <a:rPr lang="ko-KR" altLang="en-US" sz="1600" b="1" dirty="0" smtClean="0">
+                <a:latin typeface="+mn-ea"/>
+              </a:rPr>
+              <a:t>이냐 </a:t>
+            </a:r>
+            <a:r>
+              <a:rPr lang="ko-KR" altLang="en-US" sz="1600" b="1" dirty="0" err="1" smtClean="0">
+                <a:latin typeface="+mn-ea"/>
+              </a:rPr>
+              <a:t>후륜구동</a:t>
+            </a:r>
+            <a:r>
+              <a:rPr lang="en-US" altLang="ko-KR" sz="1600" b="1" dirty="0" smtClean="0">
+                <a:latin typeface="+mn-ea"/>
+              </a:rPr>
+              <a:t>(r)</a:t>
+            </a:r>
+            <a:r>
+              <a:rPr lang="ko-KR" altLang="en-US" sz="1600" b="1" smtClean="0">
+                <a:latin typeface="+mn-ea"/>
+              </a:rPr>
+              <a:t>이냐에 따른 도시 연비</a:t>
+            </a:r>
+            <a:endParaRPr lang="en-US" altLang="ko-KR" sz="1600" b="1" dirty="0" smtClean="0">
+              <a:latin typeface="+mn-ea"/>
+            </a:endParaRPr>
+          </a:p>
+        </p:txBody>
+      </p:sp>
+      <p:sp>
+        <p:nvSpPr>
+          <p:cNvPr id="5" name="TextBox 4"/>
+          <p:cNvSpPr txBox="1"/>
+          <p:nvPr/>
+        </p:nvSpPr>
+        <p:spPr>
+          <a:xfrm>
+            <a:off x="333515" y="136110"/>
+            <a:ext cx="2468946" cy="369332"/>
+          </a:xfrm>
+          <a:prstGeom prst="rect">
+            <a:avLst/>
+          </a:prstGeom>
+          <a:noFill/>
+        </p:spPr>
+        <p:txBody>
+          <a:bodyPr wrap="none" rtlCol="0">
+            <a:spAutoFit/>
+          </a:bodyPr>
+          <a:lstStyle/>
+          <a:p>
+            <a:r>
+              <a:rPr lang="en-US" altLang="ko-KR" b="1" dirty="0" smtClean="0"/>
+              <a:t>8. </a:t>
+            </a:r>
+            <a:r>
+              <a:rPr lang="en-US" altLang="ko-KR" b="1" dirty="0" smtClean="0"/>
+              <a:t>2-Sample T </a:t>
+            </a:r>
+            <a:r>
+              <a:rPr lang="ko-KR" altLang="en-US" b="1" dirty="0" smtClean="0"/>
+              <a:t>테스트</a:t>
+            </a:r>
+            <a:endParaRPr lang="ko-KR" altLang="en-US" b="1" dirty="0"/>
+          </a:p>
+        </p:txBody>
+      </p:sp>
+    </p:spTree>
+    <p:extLst>
+      <p:ext uri="{BB962C8B-B14F-4D97-AF65-F5344CB8AC3E}">
+        <p14:creationId xmlns:p14="http://schemas.microsoft.com/office/powerpoint/2010/main" val="4210654021"/>
+      </p:ext>
+    </p:extLst>
+  </p:cSld>
+  <p:clrMapOvr>
+    <a:masterClrMapping/>
+  </p:clrMapOvr>
+  <p:timing>
+    <p:tnLst>
+      <p:par>
+        <p:cTn id="1" dur="indefinite" restart="never" nodeType="tmRoot"/>
+      </p:par>
+    </p:tnLst>
+  </p:timing>
+</p:sld>
+</file>
+
+<file path=ppt/slides/slide13.xml><?xml version="1.0" encoding="utf-8"?>
+<p:sld xmlns:a="http://schemas.openxmlformats.org/drawingml/2006/main" xmlns:r="http://schemas.openxmlformats.org/officeDocument/2006/relationships" xmlns:p="http://schemas.openxmlformats.org/presentationml/2006/main">
+  <p:cSld>
+    <p:spTree>
+      <p:nvGrpSpPr>
+        <p:cNvPr id="1" name=""/>
+        <p:cNvGrpSpPr/>
+        <p:nvPr/>
+      </p:nvGrpSpPr>
+      <p:grpSpPr>
+        <a:xfrm>
+          <a:off x="0" y="0"/>
+          <a:ext cx="0" cy="0"/>
+          <a:chOff x="0" y="0"/>
+          <a:chExt cx="0" cy="0"/>
+        </a:xfrm>
+      </p:grpSpPr>
+      <p:sp>
+        <p:nvSpPr>
+          <p:cNvPr id="4" name="TextBox 3"/>
+          <p:cNvSpPr txBox="1"/>
+          <p:nvPr/>
+        </p:nvSpPr>
+        <p:spPr>
+          <a:xfrm>
+            <a:off x="353672" y="620688"/>
+            <a:ext cx="8861721" cy="1938992"/>
+          </a:xfrm>
+          <a:prstGeom prst="rect">
+            <a:avLst/>
+          </a:prstGeom>
+          <a:noFill/>
+        </p:spPr>
+        <p:txBody>
+          <a:bodyPr wrap="none" rtlCol="0">
+            <a:spAutoFit/>
+          </a:bodyPr>
+          <a:lstStyle/>
+          <a:p>
+            <a:pPr marL="342900" indent="-342900">
+              <a:lnSpc>
+                <a:spcPct val="150000"/>
+              </a:lnSpc>
+              <a:buFont typeface="+mj-lt"/>
+              <a:buAutoNum type="arabicPeriod"/>
+            </a:pPr>
+            <a:r>
+              <a:rPr lang="ko-KR" altLang="en-US" sz="1600" b="1" dirty="0">
+                <a:latin typeface="+mn-ea"/>
+              </a:rPr>
+              <a:t>새로운 당뇨병 치료제를 개발한 </a:t>
+            </a:r>
+            <a:r>
+              <a:rPr lang="ko-KR" altLang="en-US" sz="1600" b="1" dirty="0" smtClean="0">
+                <a:latin typeface="+mn-ea"/>
+              </a:rPr>
+              <a:t>제약사에서</a:t>
+            </a:r>
+            <a:r>
+              <a:rPr lang="ko-KR" altLang="en-US" sz="1600" b="1" dirty="0">
+                <a:latin typeface="+mn-ea"/>
+              </a:rPr>
+              <a:t>는</a:t>
+            </a:r>
+            <a:r>
+              <a:rPr lang="en-US" altLang="ko-KR" sz="1600" b="1" dirty="0" smtClean="0">
+                <a:latin typeface="+mn-ea"/>
+              </a:rPr>
+              <a:t> </a:t>
+            </a:r>
+            <a:r>
+              <a:rPr lang="ko-KR" altLang="en-US" sz="1600" b="1" dirty="0">
+                <a:latin typeface="+mn-ea"/>
+              </a:rPr>
+              <a:t>치료에 지대한 영향을 주는 외부요인을 </a:t>
+            </a:r>
+            <a:r>
+              <a:rPr lang="en-US" altLang="ko-KR" sz="1600" b="1" dirty="0" smtClean="0">
+                <a:latin typeface="+mn-ea"/>
+              </a:rPr>
+              <a:t/>
+            </a:r>
+            <a:br>
+              <a:rPr lang="en-US" altLang="ko-KR" sz="1600" b="1" dirty="0" smtClean="0">
+                <a:latin typeface="+mn-ea"/>
+              </a:rPr>
+            </a:br>
+            <a:r>
+              <a:rPr lang="ko-KR" altLang="en-US" sz="1600" b="1" dirty="0" smtClean="0">
+                <a:latin typeface="+mn-ea"/>
+              </a:rPr>
+              <a:t>통제하기 </a:t>
+            </a:r>
+            <a:r>
+              <a:rPr lang="ko-KR" altLang="en-US" sz="1600" b="1" dirty="0">
+                <a:latin typeface="+mn-ea"/>
+              </a:rPr>
+              <a:t>위해 </a:t>
+            </a:r>
+            <a:r>
+              <a:rPr lang="en-US" altLang="ko-KR" sz="1600" b="1" dirty="0">
+                <a:latin typeface="+mn-ea"/>
+              </a:rPr>
+              <a:t>10</a:t>
+            </a:r>
+            <a:r>
+              <a:rPr lang="ko-KR" altLang="en-US" sz="1600" b="1" dirty="0">
+                <a:latin typeface="+mn-ea"/>
+              </a:rPr>
+              <a:t>명의 당뇨병 환자를 선별하여 </a:t>
+            </a:r>
+            <a:r>
+              <a:rPr lang="en-US" altLang="ko-KR" sz="1600" b="1" dirty="0">
+                <a:latin typeface="+mn-ea"/>
+              </a:rPr>
+              <a:t>1</a:t>
+            </a:r>
+            <a:r>
+              <a:rPr lang="ko-KR" altLang="en-US" sz="1600" b="1" dirty="0">
+                <a:latin typeface="+mn-ea"/>
+              </a:rPr>
+              <a:t>달 동안 </a:t>
+            </a:r>
+            <a:r>
+              <a:rPr lang="en-US" altLang="ko-KR" sz="1600" b="1" dirty="0">
+                <a:latin typeface="+mn-ea"/>
+              </a:rPr>
+              <a:t>'</a:t>
+            </a:r>
+            <a:r>
+              <a:rPr lang="ko-KR" altLang="en-US" sz="1600" b="1" dirty="0">
+                <a:latin typeface="+mn-ea"/>
+              </a:rPr>
+              <a:t>위약</a:t>
+            </a:r>
+            <a:r>
+              <a:rPr lang="en-US" altLang="ko-KR" sz="1600" b="1" dirty="0">
+                <a:latin typeface="+mn-ea"/>
+              </a:rPr>
+              <a:t>(placebo)'</a:t>
+            </a:r>
+            <a:r>
+              <a:rPr lang="ko-KR" altLang="en-US" sz="1600" b="1" dirty="0">
+                <a:latin typeface="+mn-ea"/>
+              </a:rPr>
+              <a:t>을 투여한 기간의 </a:t>
+            </a:r>
+            <a:r>
+              <a:rPr lang="en-US" altLang="ko-KR" sz="1600" b="1" dirty="0" smtClean="0">
+                <a:latin typeface="+mn-ea"/>
+              </a:rPr>
+              <a:t/>
+            </a:r>
+            <a:br>
+              <a:rPr lang="en-US" altLang="ko-KR" sz="1600" b="1" dirty="0" smtClean="0">
+                <a:latin typeface="+mn-ea"/>
+              </a:rPr>
+            </a:br>
+            <a:r>
+              <a:rPr lang="ko-KR" altLang="en-US" sz="1600" b="1" dirty="0" smtClean="0">
+                <a:latin typeface="+mn-ea"/>
+              </a:rPr>
+              <a:t>혈당 수치</a:t>
+            </a:r>
+            <a:r>
+              <a:rPr lang="en-US" altLang="ko-KR" sz="1600" b="1" dirty="0" smtClean="0">
+                <a:latin typeface="+mn-ea"/>
+              </a:rPr>
+              <a:t>(</a:t>
+            </a:r>
+            <a:r>
+              <a:rPr lang="en-US" altLang="ko-KR" sz="1600" b="1" dirty="0">
+                <a:latin typeface="+mn-ea"/>
+              </a:rPr>
+              <a:t>Xi</a:t>
+            </a:r>
+            <a:r>
+              <a:rPr lang="en-US" altLang="ko-KR" sz="1600" b="1" dirty="0" smtClean="0">
+                <a:latin typeface="+mn-ea"/>
+              </a:rPr>
+              <a:t>)</a:t>
+            </a:r>
+            <a:r>
+              <a:rPr lang="ko-KR" altLang="en-US" sz="1600" b="1" dirty="0" smtClean="0">
+                <a:latin typeface="+mn-ea"/>
+              </a:rPr>
+              <a:t>와 </a:t>
+            </a:r>
+            <a:r>
+              <a:rPr lang="en-US" altLang="ko-KR" sz="1600" b="1" dirty="0">
+                <a:latin typeface="+mn-ea"/>
+              </a:rPr>
+              <a:t>'</a:t>
+            </a:r>
+            <a:r>
+              <a:rPr lang="ko-KR" altLang="en-US" sz="1600" b="1" dirty="0">
+                <a:latin typeface="+mn-ea"/>
+              </a:rPr>
+              <a:t>신약</a:t>
+            </a:r>
+            <a:r>
+              <a:rPr lang="en-US" altLang="ko-KR" sz="1600" b="1" dirty="0">
+                <a:latin typeface="+mn-ea"/>
+              </a:rPr>
+              <a:t>(new medicine)'</a:t>
+            </a:r>
+            <a:r>
+              <a:rPr lang="ko-KR" altLang="en-US" sz="1600" b="1" dirty="0">
+                <a:latin typeface="+mn-ea"/>
+              </a:rPr>
+              <a:t>을 투여한 </a:t>
+            </a:r>
+            <a:r>
+              <a:rPr lang="en-US" altLang="ko-KR" sz="1600" b="1" dirty="0">
+                <a:latin typeface="+mn-ea"/>
+              </a:rPr>
+              <a:t>1</a:t>
+            </a:r>
+            <a:r>
+              <a:rPr lang="ko-KR" altLang="en-US" sz="1600" b="1" dirty="0">
+                <a:latin typeface="+mn-ea"/>
+              </a:rPr>
+              <a:t>달 기간 동안의 혈당 수치</a:t>
+            </a:r>
+            <a:r>
+              <a:rPr lang="en-US" altLang="ko-KR" sz="1600" b="1" dirty="0">
+                <a:latin typeface="+mn-ea"/>
+              </a:rPr>
+              <a:t>(Yi)</a:t>
+            </a:r>
+            <a:r>
+              <a:rPr lang="ko-KR" altLang="en-US" sz="1600" b="1" dirty="0">
+                <a:latin typeface="+mn-ea"/>
+              </a:rPr>
+              <a:t>를 </a:t>
+            </a:r>
+            <a:r>
+              <a:rPr lang="en-US" altLang="ko-KR" sz="1600" b="1" dirty="0" smtClean="0">
+                <a:latin typeface="+mn-ea"/>
+              </a:rPr>
+              <a:t/>
+            </a:r>
+            <a:br>
+              <a:rPr lang="en-US" altLang="ko-KR" sz="1600" b="1" dirty="0" smtClean="0">
+                <a:latin typeface="+mn-ea"/>
+              </a:rPr>
+            </a:br>
+            <a:r>
+              <a:rPr lang="ko-KR" altLang="en-US" sz="1600" b="1" dirty="0" smtClean="0">
+                <a:latin typeface="+mn-ea"/>
+              </a:rPr>
+              <a:t>측정하여 </a:t>
+            </a:r>
+            <a:r>
+              <a:rPr lang="ko-KR" altLang="en-US" sz="1600" b="1" dirty="0">
+                <a:latin typeface="+mn-ea"/>
+              </a:rPr>
+              <a:t>짝을 이루어 혈당 차이를 유의수준 </a:t>
+            </a:r>
+            <a:r>
+              <a:rPr lang="en-US" altLang="ko-KR" sz="1600" b="1" dirty="0">
+                <a:latin typeface="+mn-ea"/>
+              </a:rPr>
+              <a:t>5%</a:t>
+            </a:r>
+            <a:r>
+              <a:rPr lang="ko-KR" altLang="en-US" sz="1600" b="1" dirty="0">
+                <a:latin typeface="+mn-ea"/>
+              </a:rPr>
+              <a:t>에서 </a:t>
+            </a:r>
+            <a:r>
+              <a:rPr lang="ko-KR" altLang="en-US" sz="1600" b="1" dirty="0" smtClean="0">
+                <a:latin typeface="+mn-ea"/>
+              </a:rPr>
+              <a:t>비교하시오</a:t>
+            </a:r>
+            <a:r>
+              <a:rPr lang="en-US" altLang="ko-KR" sz="1600" b="1" dirty="0" smtClean="0">
+                <a:latin typeface="+mn-ea"/>
+              </a:rPr>
+              <a:t>.</a:t>
+            </a:r>
+          </a:p>
+          <a:p>
+            <a:pPr marL="342900" indent="-342900">
+              <a:lnSpc>
+                <a:spcPct val="150000"/>
+              </a:lnSpc>
+              <a:buFont typeface="+mj-lt"/>
+              <a:buAutoNum type="arabicPeriod"/>
+            </a:pPr>
+            <a:endParaRPr lang="ko-KR" altLang="en-US" sz="1600" b="1" dirty="0">
+              <a:latin typeface="+mn-ea"/>
+            </a:endParaRPr>
+          </a:p>
+        </p:txBody>
+      </p:sp>
+      <p:sp>
+        <p:nvSpPr>
+          <p:cNvPr id="5" name="TextBox 4"/>
+          <p:cNvSpPr txBox="1"/>
+          <p:nvPr/>
+        </p:nvSpPr>
+        <p:spPr>
+          <a:xfrm>
+            <a:off x="333515" y="136110"/>
+            <a:ext cx="2999988" cy="369332"/>
+          </a:xfrm>
+          <a:prstGeom prst="rect">
+            <a:avLst/>
+          </a:prstGeom>
+          <a:noFill/>
+        </p:spPr>
+        <p:txBody>
+          <a:bodyPr wrap="none" rtlCol="0">
+            <a:spAutoFit/>
+          </a:bodyPr>
+          <a:lstStyle/>
+          <a:p>
+            <a:r>
+              <a:rPr lang="en-US" altLang="ko-KR" b="1" dirty="0" smtClean="0"/>
+              <a:t>9. </a:t>
+            </a:r>
+            <a:r>
+              <a:rPr lang="en-US" altLang="ko-KR" b="1" dirty="0" smtClean="0"/>
+              <a:t>Paired sample T </a:t>
+            </a:r>
+            <a:r>
+              <a:rPr lang="ko-KR" altLang="en-US" b="1" dirty="0" smtClean="0"/>
+              <a:t>테스트</a:t>
+            </a:r>
+            <a:endParaRPr lang="ko-KR" altLang="en-US" b="1" dirty="0"/>
+          </a:p>
+        </p:txBody>
+      </p:sp>
+      <p:pic>
+        <p:nvPicPr>
+          <p:cNvPr id="2" name="그림 1"/>
+          <p:cNvPicPr>
+            <a:picLocks noChangeAspect="1"/>
+          </p:cNvPicPr>
+          <p:nvPr/>
+        </p:nvPicPr>
+        <p:blipFill>
+          <a:blip r:embed="rId2" cstate="print">
+            <a:extLst>
+              <a:ext uri="{28A0092B-C50C-407E-A947-70E740481C1C}">
+                <a14:useLocalDpi xmlns:a14="http://schemas.microsoft.com/office/drawing/2010/main" val="0"/>
+              </a:ext>
+            </a:extLst>
+          </a:blip>
+          <a:stretch>
+            <a:fillRect/>
+          </a:stretch>
+        </p:blipFill>
+        <p:spPr>
+          <a:xfrm>
+            <a:off x="899592" y="2237577"/>
+            <a:ext cx="7704856" cy="2487567"/>
+          </a:xfrm>
+          <a:prstGeom prst="rect">
+            <a:avLst/>
+          </a:prstGeom>
+        </p:spPr>
+      </p:pic>
+    </p:spTree>
+    <p:extLst>
+      <p:ext uri="{BB962C8B-B14F-4D97-AF65-F5344CB8AC3E}">
+        <p14:creationId xmlns:p14="http://schemas.microsoft.com/office/powerpoint/2010/main" val="895111013"/>
+      </p:ext>
+    </p:extLst>
+  </p:cSld>
+  <p:clrMapOvr>
+    <a:masterClrMapping/>
+  </p:clrMapOvr>
+  <p:timing>
+    <p:tnLst>
+      <p:par>
+        <p:cTn id="1" dur="indefinite" restart="never" nodeType="tmRoot"/>
+      </p:par>
+    </p:tnLst>
+  </p:timing>
+</p:sld>
+</file>
+
+<file path=ppt/slides/slide14.xml><?xml version="1.0" encoding="utf-8"?>
+<p:sld xmlns:a="http://schemas.openxmlformats.org/drawingml/2006/main" xmlns:r="http://schemas.openxmlformats.org/officeDocument/2006/relationships" xmlns:p="http://schemas.openxmlformats.org/presentationml/2006/main">
+  <p:cSld>
+    <p:spTree>
+      <p:nvGrpSpPr>
+        <p:cNvPr id="1" name=""/>
+        <p:cNvGrpSpPr/>
+        <p:nvPr/>
+      </p:nvGrpSpPr>
+      <p:grpSpPr>
+        <a:xfrm>
+          <a:off x="0" y="0"/>
+          <a:ext cx="0" cy="0"/>
+          <a:chOff x="0" y="0"/>
+          <a:chExt cx="0" cy="0"/>
+        </a:xfrm>
+      </p:grpSpPr>
+      <p:sp>
+        <p:nvSpPr>
+          <p:cNvPr id="4" name="TextBox 3"/>
+          <p:cNvSpPr txBox="1"/>
+          <p:nvPr/>
+        </p:nvSpPr>
+        <p:spPr>
+          <a:xfrm>
+            <a:off x="353672" y="620688"/>
+            <a:ext cx="8703024" cy="1938992"/>
+          </a:xfrm>
+          <a:prstGeom prst="rect">
+            <a:avLst/>
+          </a:prstGeom>
+          <a:noFill/>
+        </p:spPr>
+        <p:txBody>
+          <a:bodyPr wrap="none" rtlCol="0">
+            <a:spAutoFit/>
+          </a:bodyPr>
+          <a:lstStyle/>
+          <a:p>
+            <a:pPr marL="342900" indent="-342900">
+              <a:lnSpc>
+                <a:spcPct val="150000"/>
+              </a:lnSpc>
+              <a:buFont typeface="+mj-lt"/>
+              <a:buAutoNum type="arabicPeriod" startAt="2"/>
+            </a:pPr>
+            <a:r>
+              <a:rPr lang="ko-KR" altLang="en-US" sz="1600" b="1" dirty="0" smtClean="0">
+                <a:latin typeface="+mn-ea"/>
+              </a:rPr>
+              <a:t>두 </a:t>
+            </a:r>
+            <a:r>
+              <a:rPr lang="ko-KR" altLang="en-US" sz="1600" b="1" dirty="0">
+                <a:latin typeface="+mn-ea"/>
+              </a:rPr>
+              <a:t>종류의 신발 밑창의 원재료가 닳는 정도가 차이가 있는지를 검정하기 위해서 </a:t>
+            </a:r>
+            <a:r>
+              <a:rPr lang="en-US" altLang="ko-KR" sz="1600" b="1" dirty="0">
+                <a:latin typeface="+mn-ea"/>
+              </a:rPr>
+              <a:t>10</a:t>
+            </a:r>
+            <a:r>
+              <a:rPr lang="ko-KR" altLang="en-US" sz="1600" b="1" dirty="0">
+                <a:latin typeface="+mn-ea"/>
+              </a:rPr>
+              <a:t>명의 </a:t>
+            </a:r>
+            <a:r>
+              <a:rPr lang="en-US" altLang="ko-KR" sz="1600" b="1" dirty="0" smtClean="0">
+                <a:latin typeface="+mn-ea"/>
+              </a:rPr>
+              <a:t/>
+            </a:r>
+            <a:br>
+              <a:rPr lang="en-US" altLang="ko-KR" sz="1600" b="1" dirty="0" smtClean="0">
+                <a:latin typeface="+mn-ea"/>
+              </a:rPr>
+            </a:br>
+            <a:r>
+              <a:rPr lang="ko-KR" altLang="en-US" sz="1600" b="1" dirty="0" smtClean="0">
+                <a:latin typeface="+mn-ea"/>
+              </a:rPr>
+              <a:t>소년에게 </a:t>
+            </a:r>
+            <a:r>
+              <a:rPr lang="ko-KR" altLang="en-US" sz="1600" b="1" dirty="0">
+                <a:latin typeface="+mn-ea"/>
+              </a:rPr>
+              <a:t>한쪽은 </a:t>
+            </a:r>
+            <a:r>
+              <a:rPr lang="en-US" altLang="ko-KR" sz="1600" b="1" dirty="0">
+                <a:latin typeface="+mn-ea"/>
+              </a:rPr>
+              <a:t>A</a:t>
+            </a:r>
+            <a:r>
+              <a:rPr lang="ko-KR" altLang="en-US" sz="1600" b="1" dirty="0">
+                <a:latin typeface="+mn-ea"/>
+              </a:rPr>
+              <a:t>라는 원재료로 만든 신발을 신기고</a:t>
+            </a:r>
+            <a:r>
+              <a:rPr lang="en-US" altLang="ko-KR" sz="1600" b="1" dirty="0">
+                <a:latin typeface="+mn-ea"/>
+              </a:rPr>
+              <a:t>, </a:t>
+            </a:r>
+            <a:r>
+              <a:rPr lang="ko-KR" altLang="en-US" sz="1600" b="1" dirty="0">
+                <a:latin typeface="+mn-ea"/>
+              </a:rPr>
+              <a:t>다른 한쪽은 </a:t>
+            </a:r>
+            <a:r>
+              <a:rPr lang="en-US" altLang="ko-KR" sz="1600" b="1" dirty="0">
+                <a:latin typeface="+mn-ea"/>
+              </a:rPr>
+              <a:t>B</a:t>
+            </a:r>
+            <a:r>
+              <a:rPr lang="ko-KR" altLang="en-US" sz="1600" b="1" dirty="0">
+                <a:latin typeface="+mn-ea"/>
+              </a:rPr>
+              <a:t>라는 원재료로 만든 </a:t>
+            </a:r>
+            <a:r>
+              <a:rPr lang="en-US" altLang="ko-KR" sz="1600" b="1" dirty="0" smtClean="0">
+                <a:latin typeface="+mn-ea"/>
+              </a:rPr>
+              <a:t/>
+            </a:r>
+            <a:br>
+              <a:rPr lang="en-US" altLang="ko-KR" sz="1600" b="1" dirty="0" smtClean="0">
+                <a:latin typeface="+mn-ea"/>
+              </a:rPr>
+            </a:br>
+            <a:r>
+              <a:rPr lang="ko-KR" altLang="en-US" sz="1600" b="1" dirty="0" smtClean="0">
+                <a:latin typeface="+mn-ea"/>
+              </a:rPr>
+              <a:t>신발을 </a:t>
+            </a:r>
+            <a:r>
+              <a:rPr lang="ko-KR" altLang="en-US" sz="1600" b="1" dirty="0">
+                <a:latin typeface="+mn-ea"/>
+              </a:rPr>
+              <a:t>신긴 후에</a:t>
+            </a:r>
+            <a:r>
+              <a:rPr lang="en-US" altLang="ko-KR" sz="1600" b="1" dirty="0">
+                <a:latin typeface="+mn-ea"/>
+              </a:rPr>
+              <a:t>, </a:t>
+            </a:r>
+            <a:r>
+              <a:rPr lang="ko-KR" altLang="en-US" sz="1600" b="1" dirty="0">
+                <a:latin typeface="+mn-ea"/>
+              </a:rPr>
+              <a:t>일정 기간이 </a:t>
+            </a:r>
+            <a:r>
+              <a:rPr lang="ko-KR" altLang="en-US" sz="1600" b="1" dirty="0" err="1">
+                <a:latin typeface="+mn-ea"/>
+              </a:rPr>
+              <a:t>지난후에</a:t>
+            </a:r>
+            <a:r>
+              <a:rPr lang="ko-KR" altLang="en-US" sz="1600" b="1" dirty="0">
+                <a:latin typeface="+mn-ea"/>
+              </a:rPr>
+              <a:t> 신발을 수거하여 </a:t>
+            </a:r>
+            <a:r>
+              <a:rPr lang="en-US" altLang="ko-KR" sz="1600" b="1" dirty="0">
+                <a:latin typeface="+mn-ea"/>
+              </a:rPr>
+              <a:t>10</a:t>
+            </a:r>
+            <a:r>
+              <a:rPr lang="ko-KR" altLang="en-US" sz="1600" b="1" dirty="0">
+                <a:latin typeface="+mn-ea"/>
+              </a:rPr>
+              <a:t>명의 각 소년의 왼쪽 신발 </a:t>
+            </a:r>
+            <a:r>
+              <a:rPr lang="en-US" altLang="ko-KR" sz="1600" b="1" dirty="0" smtClean="0">
+                <a:latin typeface="+mn-ea"/>
+              </a:rPr>
+              <a:t/>
+            </a:r>
+            <a:br>
+              <a:rPr lang="en-US" altLang="ko-KR" sz="1600" b="1" dirty="0" smtClean="0">
+                <a:latin typeface="+mn-ea"/>
+              </a:rPr>
+            </a:br>
+            <a:r>
+              <a:rPr lang="ko-KR" altLang="en-US" sz="1600" b="1" dirty="0" smtClean="0">
+                <a:latin typeface="+mn-ea"/>
+              </a:rPr>
+              <a:t>밑창의 </a:t>
+            </a:r>
+            <a:r>
+              <a:rPr lang="ko-KR" altLang="en-US" sz="1600" b="1" dirty="0">
+                <a:latin typeface="+mn-ea"/>
+              </a:rPr>
+              <a:t>닳은 정도와 오른쪽 신발 밑창의 닳은 정도의 차이를 비교하여 두 종류 원재료의 </a:t>
+            </a:r>
+            <a:r>
+              <a:rPr lang="en-US" altLang="ko-KR" sz="1600" b="1" dirty="0" smtClean="0">
+                <a:latin typeface="+mn-ea"/>
+              </a:rPr>
+              <a:t/>
+            </a:r>
+            <a:br>
+              <a:rPr lang="en-US" altLang="ko-KR" sz="1600" b="1" dirty="0" smtClean="0">
+                <a:latin typeface="+mn-ea"/>
+              </a:rPr>
+            </a:br>
+            <a:r>
+              <a:rPr lang="ko-KR" altLang="en-US" sz="1600" b="1" dirty="0" smtClean="0">
+                <a:latin typeface="+mn-ea"/>
+              </a:rPr>
+              <a:t>재질이 </a:t>
+            </a:r>
+            <a:r>
+              <a:rPr lang="ko-KR" altLang="en-US" sz="1600" b="1" dirty="0">
+                <a:latin typeface="+mn-ea"/>
+              </a:rPr>
+              <a:t>다른지를 </a:t>
+            </a:r>
+            <a:r>
+              <a:rPr lang="ko-KR" altLang="en-US" sz="1600" b="1" dirty="0" smtClean="0">
+                <a:latin typeface="+mn-ea"/>
+              </a:rPr>
+              <a:t>검정하시오</a:t>
+            </a:r>
+            <a:r>
+              <a:rPr lang="en-US" altLang="ko-KR" sz="1600" b="1" dirty="0">
+                <a:latin typeface="+mn-ea"/>
+              </a:rPr>
+              <a:t>.</a:t>
+            </a:r>
+            <a:endParaRPr lang="ko-KR" altLang="en-US" sz="1600" b="1" dirty="0">
+              <a:latin typeface="+mn-ea"/>
+            </a:endParaRPr>
+          </a:p>
+        </p:txBody>
+      </p:sp>
+      <p:sp>
+        <p:nvSpPr>
+          <p:cNvPr id="5" name="TextBox 4"/>
+          <p:cNvSpPr txBox="1"/>
+          <p:nvPr/>
+        </p:nvSpPr>
+        <p:spPr>
+          <a:xfrm>
+            <a:off x="333515" y="136110"/>
+            <a:ext cx="2999988" cy="369332"/>
+          </a:xfrm>
+          <a:prstGeom prst="rect">
+            <a:avLst/>
+          </a:prstGeom>
+          <a:noFill/>
+        </p:spPr>
+        <p:txBody>
+          <a:bodyPr wrap="none" rtlCol="0">
+            <a:spAutoFit/>
+          </a:bodyPr>
+          <a:lstStyle/>
+          <a:p>
+            <a:r>
+              <a:rPr lang="en-US" altLang="ko-KR" b="1" dirty="0" smtClean="0"/>
+              <a:t>9. </a:t>
+            </a:r>
+            <a:r>
+              <a:rPr lang="en-US" altLang="ko-KR" b="1" dirty="0" smtClean="0"/>
+              <a:t>Paired sample T </a:t>
+            </a:r>
+            <a:r>
+              <a:rPr lang="ko-KR" altLang="en-US" b="1" dirty="0" smtClean="0"/>
+              <a:t>테스트</a:t>
+            </a:r>
+            <a:endParaRPr lang="ko-KR" altLang="en-US" b="1" dirty="0"/>
+          </a:p>
+        </p:txBody>
+      </p:sp>
+      <p:pic>
+        <p:nvPicPr>
+          <p:cNvPr id="3" name="그림 2"/>
+          <p:cNvPicPr>
+            <a:picLocks noChangeAspect="1"/>
+          </p:cNvPicPr>
+          <p:nvPr/>
+        </p:nvPicPr>
+        <p:blipFill>
+          <a:blip r:embed="rId2" cstate="print">
+            <a:extLst>
+              <a:ext uri="{28A0092B-C50C-407E-A947-70E740481C1C}">
+                <a14:useLocalDpi xmlns:a14="http://schemas.microsoft.com/office/drawing/2010/main" val="0"/>
+              </a:ext>
+            </a:extLst>
+          </a:blip>
+          <a:stretch>
+            <a:fillRect/>
+          </a:stretch>
+        </p:blipFill>
+        <p:spPr>
+          <a:xfrm>
+            <a:off x="925422" y="2564904"/>
+            <a:ext cx="7895050" cy="2515137"/>
+          </a:xfrm>
+          <a:prstGeom prst="rect">
+            <a:avLst/>
+          </a:prstGeom>
+        </p:spPr>
+      </p:pic>
+    </p:spTree>
+    <p:extLst>
+      <p:ext uri="{BB962C8B-B14F-4D97-AF65-F5344CB8AC3E}">
+        <p14:creationId xmlns:p14="http://schemas.microsoft.com/office/powerpoint/2010/main" val="2116611283"/>
       </p:ext>
     </p:extLst>
   </p:cSld>

</xml_diff>